<commit_message>
The scripts have been optimized
1. Corrected some errors in the script.
2. Removed invalid links in scripts and lab manuals.

Signed-off-by: manjucc <106427133@qq.com>
</commit_message>
<xml_diff>
--- a/lfs-7.7-systemd/documents/LFS-on-openEuler_Lecture-Handout_v1.3.1.pptx
+++ b/lfs-7.7-systemd/documents/LFS-on-openEuler_Lecture-Handout_v1.3.1.pptx
@@ -267,7 +267,7 @@
               <a:rPr lang="en-US" smtClean="0">
                 <a:latin typeface="Huawei Sans" panose="020C0503030203020204" pitchFamily="34" charset="0"/>
               </a:rPr>
-              <a:t>4/9/2022</a:t>
+              <a:t>11/20/2022</a:t>
             </a:fld>
             <a:endParaRPr lang="en-US" dirty="0">
               <a:latin typeface="Huawei Sans" panose="020C0503030203020204" pitchFamily="34" charset="0"/>
@@ -29098,88 +29098,133 @@
             <a:pPr lvl="1"/>
             <a:r>
               <a:rPr lang="zh-CN" altLang="en-US" dirty="0"/>
-              <a:t>对 </a:t>
+              <a:t>目前，尚不能以</a:t>
+            </a:r>
+            <a:r>
+              <a:rPr lang="en-US" altLang="zh-CN" dirty="0" err="1"/>
+              <a:t>ssh</a:t>
+            </a:r>
+            <a:r>
+              <a:rPr lang="zh-CN" altLang="en-US" dirty="0"/>
+              <a:t>命令从命令行终端登录我们的</a:t>
             </a:r>
             <a:r>
               <a:rPr lang="en-US" altLang="zh-CN" dirty="0"/>
-              <a:t>LFS </a:t>
-            </a:r>
-            <a:r>
-              <a:rPr lang="zh-CN" altLang="en-US" dirty="0"/>
-              <a:t>目标系统进行进一步的网络配置和 </a:t>
+              <a:t>LFS</a:t>
+            </a:r>
+            <a:r>
+              <a:rPr lang="zh-CN" altLang="en-US" dirty="0"/>
+              <a:t>目标系统，原因在于其暂无</a:t>
+            </a:r>
+            <a:r>
+              <a:rPr lang="en-US" altLang="zh-CN" dirty="0" err="1"/>
+              <a:t>sshd</a:t>
+            </a:r>
+            <a:r>
+              <a:rPr lang="zh-CN" altLang="en-US" dirty="0"/>
+              <a:t>服务。有一种解决办法是，在通过临时工具链为</a:t>
             </a:r>
             <a:r>
               <a:rPr lang="en-US" altLang="zh-CN" dirty="0"/>
-              <a:t>C </a:t>
-            </a:r>
-            <a:r>
-              <a:rPr lang="zh-CN" altLang="en-US" dirty="0"/>
-              <a:t>语言开发环境配置并在 </a:t>
+              <a:t>LFS</a:t>
+            </a:r>
+            <a:r>
+              <a:rPr lang="zh-CN" altLang="en-US" dirty="0"/>
+              <a:t>目标系统构建软件时，将</a:t>
             </a:r>
             <a:r>
               <a:rPr lang="en-US" altLang="zh-CN" dirty="0"/>
-              <a:t>LFS </a:t>
-            </a:r>
-            <a:r>
-              <a:rPr lang="zh-CN" altLang="en-US" dirty="0"/>
-              <a:t>目标系统上实现一个 </a:t>
+              <a:t>OpenSSH</a:t>
+            </a:r>
+            <a:r>
+              <a:rPr lang="zh-CN" altLang="en-US" dirty="0"/>
+              <a:t>软件包构建到</a:t>
             </a:r>
             <a:r>
               <a:rPr lang="en-US" altLang="zh-CN" dirty="0"/>
-              <a:t>Web </a:t>
+              <a:t>LFS</a:t>
+            </a:r>
+            <a:r>
+              <a:rPr lang="zh-CN" altLang="en-US" dirty="0"/>
+              <a:t>目标系统中，请尝试完成此任务。</a:t>
+            </a:r>
+          </a:p>
+          <a:p>
+            <a:pPr lvl="1"/>
+            <a:r>
+              <a:rPr lang="zh-CN" altLang="en-US" dirty="0"/>
+              <a:t>使用模块化编译的方式，实现一个可动态加载和卸载的新文件系统。可以这样来做：参照并修改</a:t>
+            </a:r>
+            <a:r>
+              <a:rPr lang="en-US" altLang="zh-CN" dirty="0"/>
+              <a:t>Linux</a:t>
+            </a:r>
+            <a:r>
+              <a:rPr lang="zh-CN" altLang="en-US" dirty="0"/>
+              <a:t>内核</a:t>
+            </a:r>
+            <a:r>
+              <a:rPr lang="en-US" altLang="zh-CN" dirty="0"/>
+              <a:t>ext2</a:t>
+            </a:r>
+            <a:r>
+              <a:rPr lang="zh-CN" altLang="en-US" dirty="0"/>
+              <a:t>的源代码和</a:t>
+            </a:r>
+            <a:r>
+              <a:rPr lang="en-US" altLang="zh-CN" dirty="0" err="1"/>
+              <a:t>Makefile</a:t>
+            </a:r>
+            <a:r>
+              <a:rPr lang="zh-CN" altLang="en-US" dirty="0"/>
+              <a:t>文件，实现新的文件系统并对其动态加载和卸载。</a:t>
+            </a:r>
+          </a:p>
+          <a:p>
+            <a:pPr lvl="1"/>
+            <a:r>
+              <a:rPr lang="zh-CN" altLang="en-US" dirty="0"/>
+              <a:t>通过修改和重新编译内核，在</a:t>
+            </a:r>
+            <a:r>
+              <a:rPr lang="en-US" altLang="zh-CN" dirty="0"/>
+              <a:t>LFS</a:t>
+            </a:r>
+            <a:r>
+              <a:rPr lang="zh-CN" altLang="en-US" dirty="0"/>
+              <a:t>目标系统所用内核中增加一个新的系统调用。</a:t>
+            </a:r>
+          </a:p>
+          <a:p>
+            <a:pPr lvl="1"/>
+            <a:r>
+              <a:rPr lang="zh-CN" altLang="en-US" dirty="0"/>
+              <a:t>用</a:t>
+            </a:r>
+            <a:r>
+              <a:rPr lang="en-US" altLang="zh-CN" dirty="0"/>
+              <a:t>C</a:t>
+            </a:r>
+            <a:r>
+              <a:rPr lang="zh-CN" altLang="en-US" dirty="0"/>
+              <a:t>语言在</a:t>
+            </a:r>
+            <a:r>
+              <a:rPr lang="en-US" altLang="zh-CN" dirty="0"/>
+              <a:t>LFS</a:t>
+            </a:r>
+            <a:r>
+              <a:rPr lang="zh-CN" altLang="en-US" dirty="0"/>
+              <a:t>目标系统上实现一个</a:t>
+            </a:r>
+            <a:r>
+              <a:rPr lang="en-US" altLang="zh-CN" dirty="0"/>
+              <a:t>Web</a:t>
             </a:r>
             <a:r>
               <a:rPr lang="zh-CN" altLang="en-US" dirty="0"/>
               <a:t>服务器，提供静态和动态网页服务。</a:t>
             </a:r>
-            <a:endParaRPr lang="en-US" altLang="zh-CN" dirty="0"/>
-          </a:p>
-          <a:p>
-            <a:pPr lvl="1"/>
-            <a:r>
-              <a:rPr lang="zh-CN" altLang="en-US" dirty="0"/>
-              <a:t>将此 </a:t>
-            </a:r>
-            <a:r>
-              <a:rPr lang="en-US" altLang="zh-CN"/>
-              <a:t>LFS </a:t>
-            </a:r>
-            <a:r>
-              <a:rPr lang="zh-CN" altLang="en-US"/>
-              <a:t>实验</a:t>
-            </a:r>
-            <a:r>
-              <a:rPr lang="zh-CN" altLang="en-US" dirty="0"/>
-              <a:t>移植到鲲鹏平台（基于 </a:t>
-            </a:r>
-            <a:r>
-              <a:rPr lang="en-US" altLang="zh-CN" dirty="0"/>
-              <a:t>aarch64 </a:t>
-            </a:r>
-            <a:r>
-              <a:rPr lang="zh-CN" altLang="en-US" dirty="0"/>
-              <a:t>架构）上。</a:t>
-            </a:r>
-            <a:endParaRPr lang="en-US" dirty="0"/>
-          </a:p>
-          <a:p>
-            <a:r>
-              <a:rPr lang="zh-TW" altLang="en-US" dirty="0"/>
-              <a:t>和鲲鹏平台有关的资料可以参考以下链接：</a:t>
-            </a:r>
-          </a:p>
-          <a:p>
-            <a:pPr lvl="1"/>
-            <a:r>
-              <a:rPr lang="en-US" dirty="0">
-                <a:hlinkClick r:id="rId2"/>
-              </a:rPr>
-              <a:t>https://www.hikunpeng.com/</a:t>
-            </a:r>
-            <a:endParaRPr lang="en-US" dirty="0"/>
-          </a:p>
-          <a:p>
-            <a:pPr lvl="1"/>
             <a:endParaRPr lang="en-US" dirty="0"/>
           </a:p>
         </p:txBody>
@@ -33092,18 +33137,18 @@
 </file>
 
 <file path=customXml/item1.xml><?xml version="1.0" encoding="utf-8"?>
-<p:properties xmlns:p="http://schemas.microsoft.com/office/2006/metadata/properties" xmlns:xsi="http://www.w3.org/2001/XMLSchema-instance" xmlns:pc="http://schemas.microsoft.com/office/infopath/2007/PartnerControls">
-  <documentManagement/>
-</p:properties>
-</file>
-
-<file path=customXml/item2.xml><?xml version="1.0" encoding="utf-8"?>
 <?mso-contentType ?>
 <FormTemplates xmlns="http://schemas.microsoft.com/sharepoint/v3/contenttype/forms">
   <Display>DocumentLibraryForm</Display>
   <Edit>DocumentLibraryForm</Edit>
   <New>DocumentLibraryForm</New>
 </FormTemplates>
+</file>
+
+<file path=customXml/item2.xml><?xml version="1.0" encoding="utf-8"?>
+<p:properties xmlns:p="http://schemas.microsoft.com/office/2006/metadata/properties" xmlns:xsi="http://www.w3.org/2001/XMLSchema-instance" xmlns:pc="http://schemas.microsoft.com/office/infopath/2007/PartnerControls">
+  <documentManagement/>
+</p:properties>
 </file>
 
 <file path=customXml/item3.xml><?xml version="1.0" encoding="utf-8"?>
@@ -33247,6 +33292,14 @@
 </file>
 
 <file path=customXml/itemProps1.xml><?xml version="1.0" encoding="utf-8"?>
+<ds:datastoreItem xmlns:ds="http://schemas.openxmlformats.org/officeDocument/2006/customXml" ds:itemID="{FEDE263F-0510-4442-823E-69B63ECB61E1}">
+  <ds:schemaRefs>
+    <ds:schemaRef ds:uri="http://schemas.microsoft.com/sharepoint/v3/contenttype/forms"/>
+  </ds:schemaRefs>
+</ds:datastoreItem>
+</file>
+
+<file path=customXml/itemProps2.xml><?xml version="1.0" encoding="utf-8"?>
 <ds:datastoreItem xmlns:ds="http://schemas.openxmlformats.org/officeDocument/2006/customXml" ds:itemID="{DA5960F2-6186-408B-A0DC-5CA5E58B604F}">
   <ds:schemaRefs>
     <ds:schemaRef ds:uri="http://www.w3.org/XML/1998/namespace"/>
@@ -33258,14 +33311,6 @@
     <ds:schemaRef ds:uri="http://purl.org/dc/dcmitype/"/>
     <ds:schemaRef ds:uri="475f1e55-3009-46d8-9566-5d569a2b3a98"/>
     <ds:schemaRef ds:uri="http://purl.org/dc/terms/"/>
-  </ds:schemaRefs>
-</ds:datastoreItem>
-</file>
-
-<file path=customXml/itemProps2.xml><?xml version="1.0" encoding="utf-8"?>
-<ds:datastoreItem xmlns:ds="http://schemas.openxmlformats.org/officeDocument/2006/customXml" ds:itemID="{FEDE263F-0510-4442-823E-69B63ECB61E1}">
-  <ds:schemaRefs>
-    <ds:schemaRef ds:uri="http://schemas.microsoft.com/sharepoint/v3/contenttype/forms"/>
   </ds:schemaRefs>
 </ds:datastoreItem>
 </file>

</xml_diff>